<commit_message>
Folien für Vortrag hinzugefügt
</commit_message>
<xml_diff>
--- a/L_lex/Vortrag.pptx
+++ b/L_lex/Vortrag.pptx
@@ -5,14 +5,21 @@
     <p:sldMasterId id="2147483660" r:id="rId1"/>
   </p:sldMasterIdLst>
   <p:notesMasterIdLst>
-    <p:notesMasterId r:id="rId4"/>
+    <p:notesMasterId r:id="rId11"/>
   </p:notesMasterIdLst>
   <p:handoutMasterIdLst>
-    <p:handoutMasterId r:id="rId5"/>
+    <p:handoutMasterId r:id="rId12"/>
   </p:handoutMasterIdLst>
   <p:sldIdLst>
     <p:sldId id="256" r:id="rId2"/>
     <p:sldId id="257" r:id="rId3"/>
+    <p:sldId id="258" r:id="rId4"/>
+    <p:sldId id="260" r:id="rId5"/>
+    <p:sldId id="259" r:id="rId6"/>
+    <p:sldId id="261" r:id="rId7"/>
+    <p:sldId id="262" r:id="rId8"/>
+    <p:sldId id="263" r:id="rId9"/>
+    <p:sldId id="264" r:id="rId10"/>
   </p:sldIdLst>
   <p:sldSz cx="9144000" cy="6858000" type="screen4x3"/>
   <p:notesSz cx="6797675" cy="9926638"/>
@@ -212,7 +219,7 @@
           <a:p>
             <a:fld id="{EE57F349-D566-45B1-85EE-31331873AB97}" type="datetime1">
               <a:rPr lang="de-DE" smtClean="0"/>
-              <a:t>22.02.2019</a:t>
+              <a:t>24.02.2019</a:t>
             </a:fld>
             <a:endParaRPr lang="de-DE"/>
           </a:p>
@@ -378,7 +385,7 @@
           <a:p>
             <a:fld id="{694979C1-8BE8-46B2-A594-29912848ADCD}" type="datetime1">
               <a:rPr lang="de-DE" smtClean="0"/>
-              <a:t>22.02.2019</a:t>
+              <a:t>24.02.2019</a:t>
             </a:fld>
             <a:endParaRPr lang="de-DE"/>
           </a:p>
@@ -12585,7 +12592,7 @@
           <a:graphicData uri="http://schemas.openxmlformats.org/presentationml/2006/ole">
             <mc:AlternateContent xmlns:mc="http://schemas.openxmlformats.org/markup-compatibility/2006">
               <mc:Choice xmlns:v="urn:schemas-microsoft-com:vml" Requires="v">
-                <p:oleObj spid="_x0000_s1059" name="think-cell Folie" r:id="rId8" imgW="270" imgH="270" progId="TCLayout.ActiveDocument.1">
+                <p:oleObj spid="_x0000_s1067" name="think-cell Folie" r:id="rId8" imgW="270" imgH="270" progId="TCLayout.ActiveDocument.1">
                   <p:embed/>
                 </p:oleObj>
               </mc:Choice>
@@ -24052,6 +24059,21 @@
           <a:bodyPr/>
           <a:lstStyle/>
           <a:p>
+            <a:r>
+              <a:rPr lang="de-DE" dirty="0"/>
+              <a:t>	    Erstellung des Brieflexikons </a:t>
+            </a:r>
+            <a:br>
+              <a:rPr lang="de-DE" dirty="0"/>
+            </a:br>
+            <a:r>
+              <a:rPr lang="de-DE" dirty="0"/>
+              <a:t>                        für </a:t>
+            </a:r>
+            <a:r>
+              <a:rPr lang="de-DE" dirty="0" err="1"/>
+              <a:t>WiTTFind</a:t>
+            </a:r>
             <a:endParaRPr lang="de-DE" dirty="0"/>
           </a:p>
         </p:txBody>
@@ -24071,7 +24093,32 @@
           <a:bodyPr/>
           <a:lstStyle/>
           <a:p>
-            <a:endParaRPr lang="de-DE"/>
+            <a:r>
+              <a:rPr lang="de-DE" dirty="0" err="1"/>
+              <a:t>Linguistikteam</a:t>
+            </a:r>
+            <a:endParaRPr lang="de-DE" dirty="0"/>
+          </a:p>
+          <a:p>
+            <a:endParaRPr lang="de-DE" dirty="0"/>
+          </a:p>
+          <a:p>
+            <a:r>
+              <a:rPr lang="de-DE" dirty="0"/>
+              <a:t>Ines Röhrer</a:t>
+            </a:r>
+          </a:p>
+          <a:p>
+            <a:r>
+              <a:rPr lang="de-DE" dirty="0"/>
+              <a:t>Alexander Vordermaier</a:t>
+            </a:r>
+          </a:p>
+          <a:p>
+            <a:r>
+              <a:rPr lang="de-DE" dirty="0"/>
+              <a:t>Di Wu</a:t>
+            </a:r>
           </a:p>
         </p:txBody>
       </p:sp>
@@ -24123,13 +24170,146 @@
           <a:bodyPr/>
           <a:lstStyle/>
           <a:p>
-            <a:endParaRPr lang="de-DE" dirty="0"/>
+            <a:r>
+              <a:rPr lang="de-DE" dirty="0"/>
+              <a:t>Gliederung</a:t>
+            </a:r>
           </a:p>
         </p:txBody>
       </p:sp>
       <p:sp>
         <p:nvSpPr>
           <p:cNvPr id="6" name="Inhaltsplatzhalter 5"/>
+          <p:cNvSpPr>
+            <a:spLocks noGrp="1"/>
+          </p:cNvSpPr>
+          <p:nvPr>
+            <p:ph sz="quarter" idx="13"/>
+          </p:nvPr>
+        </p:nvSpPr>
+        <p:spPr>
+          <a:xfrm>
+            <a:off x="3131840" y="2564904"/>
+            <a:ext cx="5761334" cy="3744416"/>
+          </a:xfrm>
+        </p:spPr>
+        <p:txBody>
+          <a:bodyPr/>
+          <a:lstStyle/>
+          <a:p>
+            <a:pPr marL="457200" indent="-457200">
+              <a:buAutoNum type="arabicPeriod"/>
+            </a:pPr>
+            <a:r>
+              <a:rPr lang="de-DE" dirty="0"/>
+              <a:t>Einführung</a:t>
+            </a:r>
+          </a:p>
+          <a:p>
+            <a:pPr marL="457200" indent="-457200">
+              <a:buAutoNum type="arabicPeriod"/>
+            </a:pPr>
+            <a:r>
+              <a:rPr lang="de-DE" dirty="0"/>
+              <a:t>Ablauf</a:t>
+            </a:r>
+          </a:p>
+          <a:p>
+            <a:pPr marL="457200" indent="-457200">
+              <a:buAutoNum type="arabicPeriod"/>
+            </a:pPr>
+            <a:r>
+              <a:rPr lang="de-DE" dirty="0"/>
+              <a:t>Ergebnisse</a:t>
+            </a:r>
+          </a:p>
+          <a:p>
+            <a:pPr marL="457200" indent="-457200">
+              <a:buAutoNum type="arabicPeriod"/>
+            </a:pPr>
+            <a:r>
+              <a:rPr lang="de-DE" dirty="0"/>
+              <a:t>Probleme</a:t>
+            </a:r>
+          </a:p>
+          <a:p>
+            <a:pPr marL="457200" indent="-457200">
+              <a:buAutoNum type="arabicPeriod"/>
+            </a:pPr>
+            <a:endParaRPr lang="de-DE" dirty="0"/>
+          </a:p>
+        </p:txBody>
+      </p:sp>
+    </p:spTree>
+    <p:extLst>
+      <p:ext uri="{BB962C8B-B14F-4D97-AF65-F5344CB8AC3E}">
+        <p14:creationId xmlns:p14="http://schemas.microsoft.com/office/powerpoint/2010/main" val="137171920"/>
+      </p:ext>
+    </p:extLst>
+  </p:cSld>
+  <p:clrMapOvr>
+    <a:masterClrMapping/>
+  </p:clrMapOvr>
+  <p:transition spd="med">
+    <p:fade/>
+  </p:transition>
+</p:sld>
+</file>
+
+<file path=ppt/slides/slide3.xml><?xml version="1.0" encoding="utf-8"?>
+<p:sld xmlns:a="http://schemas.openxmlformats.org/drawingml/2006/main" xmlns:r="http://schemas.openxmlformats.org/officeDocument/2006/relationships" xmlns:p="http://schemas.openxmlformats.org/presentationml/2006/main">
+  <p:cSld>
+    <p:spTree>
+      <p:nvGrpSpPr>
+        <p:cNvPr id="1" name=""/>
+        <p:cNvGrpSpPr/>
+        <p:nvPr/>
+      </p:nvGrpSpPr>
+      <p:grpSpPr>
+        <a:xfrm>
+          <a:off x="0" y="0"/>
+          <a:ext cx="0" cy="0"/>
+          <a:chOff x="0" y="0"/>
+          <a:chExt cx="0" cy="0"/>
+        </a:xfrm>
+      </p:grpSpPr>
+      <p:sp>
+        <p:nvSpPr>
+          <p:cNvPr id="2" name="Titel 1">
+            <a:extLst>
+              <a:ext uri="{FF2B5EF4-FFF2-40B4-BE49-F238E27FC236}">
+                <a16:creationId xmlns:a16="http://schemas.microsoft.com/office/drawing/2014/main" id="{B2364B7C-50FC-40DA-872A-7972E3712E04}"/>
+              </a:ext>
+            </a:extLst>
+          </p:cNvPr>
+          <p:cNvSpPr>
+            <a:spLocks noGrp="1"/>
+          </p:cNvSpPr>
+          <p:nvPr>
+            <p:ph type="title"/>
+          </p:nvPr>
+        </p:nvSpPr>
+        <p:spPr/>
+        <p:txBody>
+          <a:bodyPr/>
+          <a:lstStyle/>
+          <a:p>
+            <a:r>
+              <a:rPr lang="de-DE" dirty="0"/>
+              <a:t>Einführung</a:t>
+            </a:r>
+          </a:p>
+        </p:txBody>
+      </p:sp>
+      <p:sp>
+        <p:nvSpPr>
+          <p:cNvPr id="3" name="Inhaltsplatzhalter 2">
+            <a:extLst>
+              <a:ext uri="{FF2B5EF4-FFF2-40B4-BE49-F238E27FC236}">
+                <a16:creationId xmlns:a16="http://schemas.microsoft.com/office/drawing/2014/main" id="{1A2B099F-968D-4DA8-99BD-D31092F85FE4}"/>
+              </a:ext>
+            </a:extLst>
+          </p:cNvPr>
           <p:cNvSpPr>
             <a:spLocks noGrp="1"/>
           </p:cNvSpPr>
@@ -24144,12 +24324,1274 @@
           <a:p>
             <a:endParaRPr lang="de-DE" dirty="0"/>
           </a:p>
+          <a:p>
+            <a:pPr marL="457200" indent="-457200">
+              <a:buAutoNum type="arabicPeriod"/>
+            </a:pPr>
+            <a:r>
+              <a:rPr lang="de-DE" dirty="0"/>
+              <a:t>Lexikon aus dem Briefwechsel von Ludwig Wittgenstein</a:t>
+            </a:r>
+          </a:p>
+          <a:p>
+            <a:pPr marL="457200" indent="-457200">
+              <a:buAutoNum type="arabicPeriod"/>
+            </a:pPr>
+            <a:endParaRPr lang="de-DE" dirty="0"/>
+          </a:p>
+          <a:p>
+            <a:pPr marL="457200" indent="-457200">
+              <a:buAutoNum type="arabicPeriod"/>
+            </a:pPr>
+            <a:r>
+              <a:rPr lang="de-DE" dirty="0"/>
+              <a:t>Neues </a:t>
+            </a:r>
+            <a:r>
+              <a:rPr lang="de-DE" dirty="0" err="1"/>
+              <a:t>BriefLex</a:t>
+            </a:r>
+            <a:r>
+              <a:rPr lang="de-DE" dirty="0"/>
+              <a:t> wirkt ergänzend zum aktuellen </a:t>
+            </a:r>
+            <a:r>
+              <a:rPr lang="de-DE" dirty="0" err="1"/>
+              <a:t>WittLex</a:t>
+            </a:r>
+            <a:endParaRPr lang="de-DE" dirty="0"/>
+          </a:p>
+          <a:p>
+            <a:pPr marL="457200" indent="-457200">
+              <a:buAutoNum type="arabicPeriod"/>
+            </a:pPr>
+            <a:endParaRPr lang="de-DE" dirty="0"/>
+          </a:p>
+          <a:p>
+            <a:pPr marL="457200" indent="-457200">
+              <a:buAutoNum type="arabicPeriod"/>
+            </a:pPr>
+            <a:r>
+              <a:rPr lang="de-DE" dirty="0"/>
+              <a:t>Nur Rechte an Teil der Briefe (von Wittgenstein versendet?)</a:t>
+            </a:r>
+          </a:p>
+          <a:p>
+            <a:pPr marL="457200" indent="-457200">
+              <a:buAutoNum type="arabicPeriod"/>
+            </a:pPr>
+            <a:endParaRPr lang="de-DE" dirty="0"/>
+          </a:p>
+          <a:p>
+            <a:pPr marL="457200" indent="-457200">
+              <a:buAutoNum type="arabicPeriod"/>
+            </a:pPr>
+            <a:r>
+              <a:rPr lang="de-DE" dirty="0"/>
+              <a:t>Prozess beliebig wiederholbar mit neuen Briefen</a:t>
+            </a:r>
+          </a:p>
+          <a:p>
+            <a:endParaRPr lang="de-DE" dirty="0"/>
+          </a:p>
         </p:txBody>
       </p:sp>
     </p:spTree>
     <p:extLst>
       <p:ext uri="{BB962C8B-B14F-4D97-AF65-F5344CB8AC3E}">
-        <p14:creationId xmlns:p14="http://schemas.microsoft.com/office/powerpoint/2010/main" val="137171920"/>
+        <p14:creationId xmlns:p14="http://schemas.microsoft.com/office/powerpoint/2010/main" val="1233419760"/>
+      </p:ext>
+    </p:extLst>
+  </p:cSld>
+  <p:clrMapOvr>
+    <a:masterClrMapping/>
+  </p:clrMapOvr>
+  <p:transition spd="med">
+    <p:fade/>
+  </p:transition>
+</p:sld>
+</file>
+
+<file path=ppt/slides/slide4.xml><?xml version="1.0" encoding="utf-8"?>
+<p:sld xmlns:a="http://schemas.openxmlformats.org/drawingml/2006/main" xmlns:r="http://schemas.openxmlformats.org/officeDocument/2006/relationships" xmlns:p="http://schemas.openxmlformats.org/presentationml/2006/main">
+  <p:cSld>
+    <p:spTree>
+      <p:nvGrpSpPr>
+        <p:cNvPr id="1" name=""/>
+        <p:cNvGrpSpPr/>
+        <p:nvPr/>
+      </p:nvGrpSpPr>
+      <p:grpSpPr>
+        <a:xfrm>
+          <a:off x="0" y="0"/>
+          <a:ext cx="0" cy="0"/>
+          <a:chOff x="0" y="0"/>
+          <a:chExt cx="0" cy="0"/>
+        </a:xfrm>
+      </p:grpSpPr>
+      <p:sp>
+        <p:nvSpPr>
+          <p:cNvPr id="2" name="Titel 1">
+            <a:extLst>
+              <a:ext uri="{FF2B5EF4-FFF2-40B4-BE49-F238E27FC236}">
+                <a16:creationId xmlns:a16="http://schemas.microsoft.com/office/drawing/2014/main" id="{34A29A91-1CDD-4D91-9C87-9D9D463E0279}"/>
+              </a:ext>
+            </a:extLst>
+          </p:cNvPr>
+          <p:cNvSpPr>
+            <a:spLocks noGrp="1"/>
+          </p:cNvSpPr>
+          <p:nvPr>
+            <p:ph type="title"/>
+          </p:nvPr>
+        </p:nvSpPr>
+        <p:spPr/>
+        <p:txBody>
+          <a:bodyPr/>
+          <a:lstStyle/>
+          <a:p>
+            <a:r>
+              <a:rPr lang="de-DE" dirty="0"/>
+              <a:t>Einführung</a:t>
+            </a:r>
+          </a:p>
+        </p:txBody>
+      </p:sp>
+      <p:pic>
+        <p:nvPicPr>
+          <p:cNvPr id="9" name="Inhaltsplatzhalter 8">
+            <a:extLst>
+              <a:ext uri="{FF2B5EF4-FFF2-40B4-BE49-F238E27FC236}">
+                <a16:creationId xmlns:a16="http://schemas.microsoft.com/office/drawing/2014/main" id="{35929B44-B1B2-40CD-89AD-C0BD2C9F018F}"/>
+              </a:ext>
+            </a:extLst>
+          </p:cNvPr>
+          <p:cNvPicPr>
+            <a:picLocks noGrp="1" noChangeAspect="1"/>
+          </p:cNvPicPr>
+          <p:nvPr>
+            <p:ph sz="quarter" idx="13"/>
+          </p:nvPr>
+        </p:nvPicPr>
+        <p:blipFill>
+          <a:blip r:embed="rId2"/>
+          <a:stretch>
+            <a:fillRect/>
+          </a:stretch>
+        </p:blipFill>
+        <p:spPr>
+          <a:xfrm>
+            <a:off x="1951136" y="1268760"/>
+            <a:ext cx="5169447" cy="5040312"/>
+          </a:xfrm>
+          <a:prstGeom prst="rect">
+            <a:avLst/>
+          </a:prstGeom>
+        </p:spPr>
+      </p:pic>
+      <p:sp>
+        <p:nvSpPr>
+          <p:cNvPr id="4" name="Rechteck: abgerundete Ecken 3">
+            <a:extLst>
+              <a:ext uri="{FF2B5EF4-FFF2-40B4-BE49-F238E27FC236}">
+                <a16:creationId xmlns:a16="http://schemas.microsoft.com/office/drawing/2014/main" id="{0687F1C7-CDD9-4643-8477-4DE1B7743CF7}"/>
+              </a:ext>
+            </a:extLst>
+          </p:cNvPr>
+          <p:cNvSpPr/>
+          <p:nvPr/>
+        </p:nvSpPr>
+        <p:spPr bwMode="auto">
+          <a:xfrm>
+            <a:off x="827584" y="1916832"/>
+            <a:ext cx="914400" cy="914400"/>
+          </a:xfrm>
+          <a:prstGeom prst="roundRect">
+            <a:avLst/>
+          </a:prstGeom>
+          <a:noFill/>
+          <a:ln>
+            <a:noFill/>
+          </a:ln>
+          <a:effectLst/>
+          <a:extLst>
+            <a:ext uri="{909E8E84-426E-40DD-AFC4-6F175D3DCCD1}">
+              <a14:hiddenFill xmlns:a14="http://schemas.microsoft.com/office/drawing/2010/main">
+                <a:solidFill>
+                  <a:schemeClr val="accent1"/>
+                </a:solidFill>
+              </a14:hiddenFill>
+            </a:ext>
+            <a:ext uri="{91240B29-F687-4F45-9708-019B960494DF}">
+              <a14:hiddenLine xmlns:a14="http://schemas.microsoft.com/office/drawing/2010/main" w="9525" cap="flat" cmpd="sng" algn="ctr">
+                <a:solidFill>
+                  <a:schemeClr val="tx1"/>
+                </a:solidFill>
+                <a:prstDash val="solid"/>
+                <a:round/>
+                <a:headEnd type="none" w="med" len="med"/>
+                <a:tailEnd type="none" w="med" len="med"/>
+              </a14:hiddenLine>
+            </a:ext>
+            <a:ext uri="{AF507438-7753-43E0-B8FC-AC1667EBCBE1}">
+              <a14:hiddenEffects xmlns:a14="http://schemas.microsoft.com/office/drawing/2010/main">
+                <a:effectLst>
+                  <a:outerShdw blurRad="63500" dist="38099" dir="2700000" algn="ctr" rotWithShape="0">
+                    <a:schemeClr val="bg2">
+                      <a:alpha val="74998"/>
+                    </a:schemeClr>
+                  </a:outerShdw>
+                </a:effectLst>
+              </a14:hiddenEffects>
+            </a:ext>
+          </a:extLst>
+        </p:spPr>
+        <p:txBody>
+          <a:bodyPr vert="horz" wrap="square" lIns="91440" tIns="45720" rIns="91440" bIns="45720" numCol="1" rtlCol="0" anchor="t" anchorCtr="0" compatLnSpc="1">
+            <a:prstTxWarp prst="textNoShape">
+              <a:avLst/>
+            </a:prstTxWarp>
+          </a:bodyPr>
+          <a:lstStyle/>
+          <a:p>
+            <a:pPr marL="0" marR="0" indent="0" algn="l" defTabSz="914400" rtl="0" eaLnBrk="0" fontAlgn="base" latinLnBrk="0" hangingPunct="0">
+              <a:lnSpc>
+                <a:spcPct val="100000"/>
+              </a:lnSpc>
+              <a:spcBef>
+                <a:spcPct val="0"/>
+              </a:spcBef>
+              <a:spcAft>
+                <a:spcPct val="0"/>
+              </a:spcAft>
+              <a:buClrTx/>
+              <a:buSzTx/>
+              <a:buFontTx/>
+              <a:buNone/>
+              <a:tabLst/>
+            </a:pPr>
+            <a:endParaRPr kumimoji="0" lang="de-DE" sz="1400" b="0" i="0" u="none" strike="noStrike" cap="none" normalizeH="0" baseline="0">
+              <a:ln>
+                <a:noFill/>
+              </a:ln>
+              <a:solidFill>
+                <a:schemeClr val="tx1"/>
+              </a:solidFill>
+              <a:effectLst/>
+              <a:latin typeface="LMU CompatilFact" pitchFamily="2" charset="0"/>
+            </a:endParaRPr>
+          </a:p>
+        </p:txBody>
+      </p:sp>
+      <p:sp>
+        <p:nvSpPr>
+          <p:cNvPr id="5" name="Rechteck: abgerundete Ecken 4">
+            <a:extLst>
+              <a:ext uri="{FF2B5EF4-FFF2-40B4-BE49-F238E27FC236}">
+                <a16:creationId xmlns:a16="http://schemas.microsoft.com/office/drawing/2014/main" id="{A5F5E32E-0B51-474E-A6EE-D4FA0A4F56FB}"/>
+              </a:ext>
+            </a:extLst>
+          </p:cNvPr>
+          <p:cNvSpPr/>
+          <p:nvPr/>
+        </p:nvSpPr>
+        <p:spPr bwMode="auto">
+          <a:xfrm>
+            <a:off x="1475656" y="2204864"/>
+            <a:ext cx="864096" cy="504056"/>
+          </a:xfrm>
+          <a:prstGeom prst="roundRect">
+            <a:avLst/>
+          </a:prstGeom>
+          <a:noFill/>
+          <a:ln>
+            <a:noFill/>
+          </a:ln>
+          <a:effectLst/>
+          <a:extLst>
+            <a:ext uri="{909E8E84-426E-40DD-AFC4-6F175D3DCCD1}">
+              <a14:hiddenFill xmlns:a14="http://schemas.microsoft.com/office/drawing/2010/main">
+                <a:solidFill>
+                  <a:schemeClr val="accent1"/>
+                </a:solidFill>
+              </a14:hiddenFill>
+            </a:ext>
+            <a:ext uri="{91240B29-F687-4F45-9708-019B960494DF}">
+              <a14:hiddenLine xmlns:a14="http://schemas.microsoft.com/office/drawing/2010/main" w="9525" cap="flat" cmpd="sng" algn="ctr">
+                <a:solidFill>
+                  <a:schemeClr val="tx1"/>
+                </a:solidFill>
+                <a:prstDash val="solid"/>
+                <a:round/>
+                <a:headEnd type="none" w="med" len="med"/>
+                <a:tailEnd type="none" w="med" len="med"/>
+              </a14:hiddenLine>
+            </a:ext>
+            <a:ext uri="{AF507438-7753-43E0-B8FC-AC1667EBCBE1}">
+              <a14:hiddenEffects xmlns:a14="http://schemas.microsoft.com/office/drawing/2010/main">
+                <a:effectLst>
+                  <a:outerShdw blurRad="63500" dist="38099" dir="2700000" algn="ctr" rotWithShape="0">
+                    <a:schemeClr val="bg2">
+                      <a:alpha val="74998"/>
+                    </a:schemeClr>
+                  </a:outerShdw>
+                </a:effectLst>
+              </a14:hiddenEffects>
+            </a:ext>
+          </a:extLst>
+        </p:spPr>
+        <p:txBody>
+          <a:bodyPr vert="horz" wrap="square" lIns="91440" tIns="45720" rIns="91440" bIns="45720" numCol="1" rtlCol="0" anchor="t" anchorCtr="0" compatLnSpc="1">
+            <a:prstTxWarp prst="textNoShape">
+              <a:avLst/>
+            </a:prstTxWarp>
+          </a:bodyPr>
+          <a:lstStyle/>
+          <a:p>
+            <a:pPr marL="0" marR="0" indent="0" algn="l" defTabSz="914400" rtl="0" eaLnBrk="0" fontAlgn="base" latinLnBrk="0" hangingPunct="0">
+              <a:lnSpc>
+                <a:spcPct val="100000"/>
+              </a:lnSpc>
+              <a:spcBef>
+                <a:spcPct val="0"/>
+              </a:spcBef>
+              <a:spcAft>
+                <a:spcPct val="0"/>
+              </a:spcAft>
+              <a:buClrTx/>
+              <a:buSzTx/>
+              <a:buFontTx/>
+              <a:buNone/>
+              <a:tabLst/>
+            </a:pPr>
+            <a:endParaRPr kumimoji="0" lang="de-DE" sz="2000" b="0" i="0" u="none" strike="noStrike" cap="none" normalizeH="0" baseline="0" dirty="0">
+              <a:ln>
+                <a:noFill/>
+              </a:ln>
+              <a:solidFill>
+                <a:schemeClr val="tx1"/>
+              </a:solidFill>
+              <a:effectLst/>
+              <a:latin typeface="LMU CompatilFact" pitchFamily="2" charset="0"/>
+            </a:endParaRPr>
+          </a:p>
+        </p:txBody>
+      </p:sp>
+      <p:sp>
+        <p:nvSpPr>
+          <p:cNvPr id="6" name="Rechteck: abgerundete Ecken 5">
+            <a:extLst>
+              <a:ext uri="{FF2B5EF4-FFF2-40B4-BE49-F238E27FC236}">
+                <a16:creationId xmlns:a16="http://schemas.microsoft.com/office/drawing/2014/main" id="{3C5A1C7F-AE14-41E2-AD04-CF75DF62AE91}"/>
+              </a:ext>
+            </a:extLst>
+          </p:cNvPr>
+          <p:cNvSpPr/>
+          <p:nvPr/>
+        </p:nvSpPr>
+        <p:spPr bwMode="auto">
+          <a:xfrm>
+            <a:off x="1259632" y="3212976"/>
+            <a:ext cx="482352" cy="432395"/>
+          </a:xfrm>
+          <a:prstGeom prst="roundRect">
+            <a:avLst/>
+          </a:prstGeom>
+          <a:noFill/>
+          <a:ln>
+            <a:noFill/>
+          </a:ln>
+          <a:effectLst/>
+          <a:extLst>
+            <a:ext uri="{909E8E84-426E-40DD-AFC4-6F175D3DCCD1}">
+              <a14:hiddenFill xmlns:a14="http://schemas.microsoft.com/office/drawing/2010/main">
+                <a:solidFill>
+                  <a:schemeClr val="accent1"/>
+                </a:solidFill>
+              </a14:hiddenFill>
+            </a:ext>
+            <a:ext uri="{91240B29-F687-4F45-9708-019B960494DF}">
+              <a14:hiddenLine xmlns:a14="http://schemas.microsoft.com/office/drawing/2010/main" w="9525" cap="flat" cmpd="sng" algn="ctr">
+                <a:solidFill>
+                  <a:schemeClr val="tx1"/>
+                </a:solidFill>
+                <a:prstDash val="solid"/>
+                <a:round/>
+                <a:headEnd type="none" w="med" len="med"/>
+                <a:tailEnd type="none" w="med" len="med"/>
+              </a14:hiddenLine>
+            </a:ext>
+            <a:ext uri="{AF507438-7753-43E0-B8FC-AC1667EBCBE1}">
+              <a14:hiddenEffects xmlns:a14="http://schemas.microsoft.com/office/drawing/2010/main">
+                <a:effectLst>
+                  <a:outerShdw blurRad="63500" dist="38099" dir="2700000" algn="ctr" rotWithShape="0">
+                    <a:schemeClr val="bg2">
+                      <a:alpha val="74998"/>
+                    </a:schemeClr>
+                  </a:outerShdw>
+                </a:effectLst>
+              </a14:hiddenEffects>
+            </a:ext>
+          </a:extLst>
+        </p:spPr>
+        <p:txBody>
+          <a:bodyPr vert="horz" wrap="square" lIns="91440" tIns="45720" rIns="91440" bIns="45720" numCol="1" rtlCol="0" anchor="t" anchorCtr="0" compatLnSpc="1">
+            <a:prstTxWarp prst="textNoShape">
+              <a:avLst/>
+            </a:prstTxWarp>
+          </a:bodyPr>
+          <a:lstStyle/>
+          <a:p>
+            <a:pPr marL="0" marR="0" indent="0" algn="l" defTabSz="914400" rtl="0" eaLnBrk="0" fontAlgn="base" latinLnBrk="0" hangingPunct="0">
+              <a:lnSpc>
+                <a:spcPct val="100000"/>
+              </a:lnSpc>
+              <a:spcBef>
+                <a:spcPct val="0"/>
+              </a:spcBef>
+              <a:spcAft>
+                <a:spcPct val="0"/>
+              </a:spcAft>
+              <a:buClrTx/>
+              <a:buSzTx/>
+              <a:buFontTx/>
+              <a:buNone/>
+              <a:tabLst/>
+            </a:pPr>
+            <a:endParaRPr kumimoji="0" lang="de-DE" sz="1400" b="0" i="0" u="none" strike="noStrike" cap="none" normalizeH="0" baseline="0" dirty="0">
+              <a:ln>
+                <a:noFill/>
+              </a:ln>
+              <a:solidFill>
+                <a:schemeClr val="tx1"/>
+              </a:solidFill>
+              <a:effectLst/>
+              <a:latin typeface="LMU CompatilFact" pitchFamily="2" charset="0"/>
+            </a:endParaRPr>
+          </a:p>
+        </p:txBody>
+      </p:sp>
+      <p:sp>
+        <p:nvSpPr>
+          <p:cNvPr id="7" name="Rechteck: abgerundete Ecken 6">
+            <a:extLst>
+              <a:ext uri="{FF2B5EF4-FFF2-40B4-BE49-F238E27FC236}">
+                <a16:creationId xmlns:a16="http://schemas.microsoft.com/office/drawing/2014/main" id="{FF8EDE4C-D831-4698-9FAF-862B7F1FE026}"/>
+              </a:ext>
+            </a:extLst>
+          </p:cNvPr>
+          <p:cNvSpPr/>
+          <p:nvPr/>
+        </p:nvSpPr>
+        <p:spPr bwMode="auto">
+          <a:xfrm>
+            <a:off x="827584" y="2708920"/>
+            <a:ext cx="1584176" cy="648072"/>
+          </a:xfrm>
+          <a:prstGeom prst="roundRect">
+            <a:avLst/>
+          </a:prstGeom>
+          <a:noFill/>
+          <a:ln>
+            <a:noFill/>
+          </a:ln>
+          <a:effectLst/>
+          <a:extLst>
+            <a:ext uri="{909E8E84-426E-40DD-AFC4-6F175D3DCCD1}">
+              <a14:hiddenFill xmlns:a14="http://schemas.microsoft.com/office/drawing/2010/main">
+                <a:solidFill>
+                  <a:schemeClr val="accent1"/>
+                </a:solidFill>
+              </a14:hiddenFill>
+            </a:ext>
+            <a:ext uri="{91240B29-F687-4F45-9708-019B960494DF}">
+              <a14:hiddenLine xmlns:a14="http://schemas.microsoft.com/office/drawing/2010/main" w="9525" cap="flat" cmpd="sng" algn="ctr">
+                <a:solidFill>
+                  <a:schemeClr val="tx1"/>
+                </a:solidFill>
+                <a:prstDash val="solid"/>
+                <a:round/>
+                <a:headEnd type="none" w="med" len="med"/>
+                <a:tailEnd type="none" w="med" len="med"/>
+              </a14:hiddenLine>
+            </a:ext>
+            <a:ext uri="{AF507438-7753-43E0-B8FC-AC1667EBCBE1}">
+              <a14:hiddenEffects xmlns:a14="http://schemas.microsoft.com/office/drawing/2010/main">
+                <a:effectLst>
+                  <a:outerShdw blurRad="63500" dist="38099" dir="2700000" algn="ctr" rotWithShape="0">
+                    <a:schemeClr val="bg2">
+                      <a:alpha val="74998"/>
+                    </a:schemeClr>
+                  </a:outerShdw>
+                </a:effectLst>
+              </a14:hiddenEffects>
+            </a:ext>
+          </a:extLst>
+        </p:spPr>
+        <p:txBody>
+          <a:bodyPr vert="horz" wrap="square" lIns="91440" tIns="45720" rIns="91440" bIns="45720" numCol="1" rtlCol="0" anchor="t" anchorCtr="0" compatLnSpc="1">
+            <a:prstTxWarp prst="textNoShape">
+              <a:avLst/>
+            </a:prstTxWarp>
+          </a:bodyPr>
+          <a:lstStyle/>
+          <a:p>
+            <a:pPr marL="0" marR="0" indent="0" algn="l" defTabSz="914400" rtl="0" eaLnBrk="0" fontAlgn="base" latinLnBrk="0" hangingPunct="0">
+              <a:lnSpc>
+                <a:spcPct val="100000"/>
+              </a:lnSpc>
+              <a:spcBef>
+                <a:spcPct val="0"/>
+              </a:spcBef>
+              <a:spcAft>
+                <a:spcPct val="0"/>
+              </a:spcAft>
+              <a:buClrTx/>
+              <a:buSzTx/>
+              <a:buFontTx/>
+              <a:buNone/>
+              <a:tabLst/>
+            </a:pPr>
+            <a:endParaRPr kumimoji="0" lang="de-DE" sz="1400" b="0" i="0" u="none" strike="noStrike" cap="none" normalizeH="0" baseline="0">
+              <a:ln>
+                <a:noFill/>
+              </a:ln>
+              <a:solidFill>
+                <a:schemeClr val="tx1"/>
+              </a:solidFill>
+              <a:effectLst/>
+              <a:latin typeface="LMU CompatilFact" pitchFamily="2" charset="0"/>
+            </a:endParaRPr>
+          </a:p>
+        </p:txBody>
+      </p:sp>
+    </p:spTree>
+    <p:extLst>
+      <p:ext uri="{BB962C8B-B14F-4D97-AF65-F5344CB8AC3E}">
+        <p14:creationId xmlns:p14="http://schemas.microsoft.com/office/powerpoint/2010/main" val="1603230644"/>
+      </p:ext>
+    </p:extLst>
+  </p:cSld>
+  <p:clrMapOvr>
+    <a:masterClrMapping/>
+  </p:clrMapOvr>
+  <p:transition spd="med">
+    <p:fade/>
+  </p:transition>
+</p:sld>
+</file>
+
+<file path=ppt/slides/slide5.xml><?xml version="1.0" encoding="utf-8"?>
+<p:sld xmlns:a="http://schemas.openxmlformats.org/drawingml/2006/main" xmlns:r="http://schemas.openxmlformats.org/officeDocument/2006/relationships" xmlns:p="http://schemas.openxmlformats.org/presentationml/2006/main">
+  <p:cSld>
+    <p:spTree>
+      <p:nvGrpSpPr>
+        <p:cNvPr id="1" name=""/>
+        <p:cNvGrpSpPr/>
+        <p:nvPr/>
+      </p:nvGrpSpPr>
+      <p:grpSpPr>
+        <a:xfrm>
+          <a:off x="0" y="0"/>
+          <a:ext cx="0" cy="0"/>
+          <a:chOff x="0" y="0"/>
+          <a:chExt cx="0" cy="0"/>
+        </a:xfrm>
+      </p:grpSpPr>
+      <p:sp>
+        <p:nvSpPr>
+          <p:cNvPr id="2" name="Titel 1">
+            <a:extLst>
+              <a:ext uri="{FF2B5EF4-FFF2-40B4-BE49-F238E27FC236}">
+                <a16:creationId xmlns:a16="http://schemas.microsoft.com/office/drawing/2014/main" id="{1CEC69EA-8A45-43A7-B6D3-E7FB2451544D}"/>
+              </a:ext>
+            </a:extLst>
+          </p:cNvPr>
+          <p:cNvSpPr>
+            <a:spLocks noGrp="1"/>
+          </p:cNvSpPr>
+          <p:nvPr>
+            <p:ph type="title"/>
+          </p:nvPr>
+        </p:nvSpPr>
+        <p:spPr/>
+        <p:txBody>
+          <a:bodyPr/>
+          <a:lstStyle/>
+          <a:p>
+            <a:r>
+              <a:rPr lang="de-DE" dirty="0"/>
+              <a:t>Ablauf</a:t>
+            </a:r>
+          </a:p>
+        </p:txBody>
+      </p:sp>
+      <p:sp>
+        <p:nvSpPr>
+          <p:cNvPr id="3" name="Inhaltsplatzhalter 2">
+            <a:extLst>
+              <a:ext uri="{FF2B5EF4-FFF2-40B4-BE49-F238E27FC236}">
+                <a16:creationId xmlns:a16="http://schemas.microsoft.com/office/drawing/2014/main" id="{86C90E04-B28F-4A38-BD0B-F2749BFA8429}"/>
+              </a:ext>
+            </a:extLst>
+          </p:cNvPr>
+          <p:cNvSpPr>
+            <a:spLocks noGrp="1"/>
+          </p:cNvSpPr>
+          <p:nvPr>
+            <p:ph sz="quarter" idx="13"/>
+          </p:nvPr>
+        </p:nvSpPr>
+        <p:spPr/>
+        <p:txBody>
+          <a:bodyPr/>
+          <a:lstStyle/>
+          <a:p>
+            <a:r>
+              <a:rPr lang="de-DE" u="sng" dirty="0"/>
+              <a:t>Erstellung einer Wortliste</a:t>
+            </a:r>
+          </a:p>
+          <a:p>
+            <a:endParaRPr lang="de-DE" dirty="0"/>
+          </a:p>
+          <a:p>
+            <a:r>
+              <a:rPr lang="de-DE" dirty="0"/>
+              <a:t>Einlesen aller Briefe</a:t>
+            </a:r>
+          </a:p>
+          <a:p>
+            <a:r>
+              <a:rPr lang="de-DE" dirty="0"/>
+              <a:t>Erkennen der Sprache der Briefe mit </a:t>
+            </a:r>
+            <a:r>
+              <a:rPr lang="de-DE" dirty="0" err="1"/>
+              <a:t>langdetect</a:t>
+            </a:r>
+            <a:endParaRPr lang="de-DE" dirty="0"/>
+          </a:p>
+          <a:p>
+            <a:r>
+              <a:rPr lang="de-DE" dirty="0"/>
+              <a:t>Aufbau der Wortliste mit Sprachtags</a:t>
+            </a:r>
+          </a:p>
+          <a:p>
+            <a:endParaRPr lang="de-DE" dirty="0"/>
+          </a:p>
+        </p:txBody>
+      </p:sp>
+      <p:pic>
+        <p:nvPicPr>
+          <p:cNvPr id="4" name="Grafik 3">
+            <a:extLst>
+              <a:ext uri="{FF2B5EF4-FFF2-40B4-BE49-F238E27FC236}">
+                <a16:creationId xmlns:a16="http://schemas.microsoft.com/office/drawing/2014/main" id="{06877299-DA81-4035-B3D2-4884C01094DA}"/>
+              </a:ext>
+            </a:extLst>
+          </p:cNvPr>
+          <p:cNvPicPr>
+            <a:picLocks noChangeAspect="1"/>
+          </p:cNvPicPr>
+          <p:nvPr/>
+        </p:nvPicPr>
+        <p:blipFill>
+          <a:blip r:embed="rId2"/>
+          <a:stretch>
+            <a:fillRect/>
+          </a:stretch>
+        </p:blipFill>
+        <p:spPr>
+          <a:xfrm>
+            <a:off x="2915816" y="3789040"/>
+            <a:ext cx="2488664" cy="2156842"/>
+          </a:xfrm>
+          <a:prstGeom prst="rect">
+            <a:avLst/>
+          </a:prstGeom>
+        </p:spPr>
+      </p:pic>
+    </p:spTree>
+    <p:extLst>
+      <p:ext uri="{BB962C8B-B14F-4D97-AF65-F5344CB8AC3E}">
+        <p14:creationId xmlns:p14="http://schemas.microsoft.com/office/powerpoint/2010/main" val="21631110"/>
+      </p:ext>
+    </p:extLst>
+  </p:cSld>
+  <p:clrMapOvr>
+    <a:masterClrMapping/>
+  </p:clrMapOvr>
+  <p:transition spd="med">
+    <p:fade/>
+  </p:transition>
+</p:sld>
+</file>
+
+<file path=ppt/slides/slide6.xml><?xml version="1.0" encoding="utf-8"?>
+<p:sld xmlns:a="http://schemas.openxmlformats.org/drawingml/2006/main" xmlns:r="http://schemas.openxmlformats.org/officeDocument/2006/relationships" xmlns:p="http://schemas.openxmlformats.org/presentationml/2006/main">
+  <p:cSld>
+    <p:spTree>
+      <p:nvGrpSpPr>
+        <p:cNvPr id="1" name=""/>
+        <p:cNvGrpSpPr/>
+        <p:nvPr/>
+      </p:nvGrpSpPr>
+      <p:grpSpPr>
+        <a:xfrm>
+          <a:off x="0" y="0"/>
+          <a:ext cx="0" cy="0"/>
+          <a:chOff x="0" y="0"/>
+          <a:chExt cx="0" cy="0"/>
+        </a:xfrm>
+      </p:grpSpPr>
+      <p:sp>
+        <p:nvSpPr>
+          <p:cNvPr id="2" name="Titel 1">
+            <a:extLst>
+              <a:ext uri="{FF2B5EF4-FFF2-40B4-BE49-F238E27FC236}">
+                <a16:creationId xmlns:a16="http://schemas.microsoft.com/office/drawing/2014/main" id="{F2770444-1840-459C-BA2B-7AE3F4B4F440}"/>
+              </a:ext>
+            </a:extLst>
+          </p:cNvPr>
+          <p:cNvSpPr>
+            <a:spLocks noGrp="1"/>
+          </p:cNvSpPr>
+          <p:nvPr>
+            <p:ph type="title"/>
+          </p:nvPr>
+        </p:nvSpPr>
+        <p:spPr/>
+        <p:txBody>
+          <a:bodyPr/>
+          <a:lstStyle/>
+          <a:p>
+            <a:r>
+              <a:rPr lang="de-DE" dirty="0"/>
+              <a:t>Ablauf</a:t>
+            </a:r>
+          </a:p>
+        </p:txBody>
+      </p:sp>
+      <p:sp>
+        <p:nvSpPr>
+          <p:cNvPr id="3" name="Inhaltsplatzhalter 2">
+            <a:extLst>
+              <a:ext uri="{FF2B5EF4-FFF2-40B4-BE49-F238E27FC236}">
+                <a16:creationId xmlns:a16="http://schemas.microsoft.com/office/drawing/2014/main" id="{DEAB5434-0624-4E8C-B36B-54379CC3D7DC}"/>
+              </a:ext>
+            </a:extLst>
+          </p:cNvPr>
+          <p:cNvSpPr>
+            <a:spLocks noGrp="1"/>
+          </p:cNvSpPr>
+          <p:nvPr>
+            <p:ph sz="quarter" idx="13"/>
+          </p:nvPr>
+        </p:nvSpPr>
+        <p:spPr/>
+        <p:txBody>
+          <a:bodyPr/>
+          <a:lstStyle/>
+          <a:p>
+            <a:r>
+              <a:rPr lang="de-DE" u="sng" dirty="0"/>
+              <a:t>Lexikonvergleiche</a:t>
+            </a:r>
+          </a:p>
+          <a:p>
+            <a:endParaRPr lang="de-DE" u="sng" dirty="0"/>
+          </a:p>
+          <a:p>
+            <a:r>
+              <a:rPr lang="de-DE" dirty="0"/>
+              <a:t>Vergleich mit dem </a:t>
+            </a:r>
+            <a:r>
+              <a:rPr lang="de-DE" dirty="0" err="1"/>
+              <a:t>WittLex</a:t>
+            </a:r>
+            <a:r>
+              <a:rPr lang="de-DE" dirty="0"/>
+              <a:t> und dem </a:t>
+            </a:r>
+            <a:r>
+              <a:rPr lang="de-DE" dirty="0" err="1"/>
+              <a:t>CisLex</a:t>
+            </a:r>
+            <a:r>
+              <a:rPr lang="de-DE" dirty="0"/>
+              <a:t> -&gt; Erste Einträge</a:t>
+            </a:r>
+          </a:p>
+          <a:p>
+            <a:r>
+              <a:rPr lang="de-DE" dirty="0"/>
+              <a:t>Aufteilung in mehrere Dateien:</a:t>
+            </a:r>
+          </a:p>
+          <a:p>
+            <a:pPr>
+              <a:buFont typeface="Arial" panose="020B0604020202020204" pitchFamily="34" charset="0"/>
+              <a:buChar char="•"/>
+            </a:pPr>
+            <a:r>
+              <a:rPr lang="de-DE" dirty="0"/>
+              <a:t>Wörter aus Briefen die weder deutsch noch englisch sind</a:t>
+            </a:r>
+          </a:p>
+          <a:p>
+            <a:pPr>
+              <a:buFont typeface="Arial" panose="020B0604020202020204" pitchFamily="34" charset="0"/>
+              <a:buChar char="•"/>
+            </a:pPr>
+            <a:r>
+              <a:rPr lang="de-DE" dirty="0"/>
+              <a:t>Wörter die bereits in den Lexika sind, aber sich in Groß/Kleinschreibung unterscheiden</a:t>
+            </a:r>
+          </a:p>
+          <a:p>
+            <a:pPr>
+              <a:buFont typeface="Arial" panose="020B0604020202020204" pitchFamily="34" charset="0"/>
+              <a:buChar char="•"/>
+            </a:pPr>
+            <a:r>
+              <a:rPr lang="de-DE" dirty="0"/>
+              <a:t>Wörter die manuell gelöscht wurden</a:t>
+            </a:r>
+          </a:p>
+          <a:p>
+            <a:pPr>
+              <a:buFont typeface="Arial" panose="020B0604020202020204" pitchFamily="34" charset="0"/>
+              <a:buChar char="•"/>
+            </a:pPr>
+            <a:r>
+              <a:rPr lang="de-DE" dirty="0"/>
+              <a:t>Neue englische und deutsche Wörter</a:t>
+            </a:r>
+          </a:p>
+          <a:p>
+            <a:pPr>
+              <a:buFont typeface="Arial" panose="020B0604020202020204" pitchFamily="34" charset="0"/>
+              <a:buChar char="•"/>
+            </a:pPr>
+            <a:endParaRPr lang="de-DE" dirty="0"/>
+          </a:p>
+          <a:p>
+            <a:pPr>
+              <a:buFont typeface="Arial" panose="020B0604020202020204" pitchFamily="34" charset="0"/>
+              <a:buChar char="•"/>
+            </a:pPr>
+            <a:endParaRPr lang="de-DE" dirty="0"/>
+          </a:p>
+        </p:txBody>
+      </p:sp>
+    </p:spTree>
+    <p:extLst>
+      <p:ext uri="{BB962C8B-B14F-4D97-AF65-F5344CB8AC3E}">
+        <p14:creationId xmlns:p14="http://schemas.microsoft.com/office/powerpoint/2010/main" val="2030863825"/>
+      </p:ext>
+    </p:extLst>
+  </p:cSld>
+  <p:clrMapOvr>
+    <a:masterClrMapping/>
+  </p:clrMapOvr>
+  <p:transition spd="med">
+    <p:fade/>
+  </p:transition>
+</p:sld>
+</file>
+
+<file path=ppt/slides/slide7.xml><?xml version="1.0" encoding="utf-8"?>
+<p:sld xmlns:a="http://schemas.openxmlformats.org/drawingml/2006/main" xmlns:r="http://schemas.openxmlformats.org/officeDocument/2006/relationships" xmlns:p="http://schemas.openxmlformats.org/presentationml/2006/main">
+  <p:cSld>
+    <p:spTree>
+      <p:nvGrpSpPr>
+        <p:cNvPr id="1" name=""/>
+        <p:cNvGrpSpPr/>
+        <p:nvPr/>
+      </p:nvGrpSpPr>
+      <p:grpSpPr>
+        <a:xfrm>
+          <a:off x="0" y="0"/>
+          <a:ext cx="0" cy="0"/>
+          <a:chOff x="0" y="0"/>
+          <a:chExt cx="0" cy="0"/>
+        </a:xfrm>
+      </p:grpSpPr>
+      <p:sp>
+        <p:nvSpPr>
+          <p:cNvPr id="2" name="Titel 1">
+            <a:extLst>
+              <a:ext uri="{FF2B5EF4-FFF2-40B4-BE49-F238E27FC236}">
+                <a16:creationId xmlns:a16="http://schemas.microsoft.com/office/drawing/2014/main" id="{69C647C1-E323-40F3-A807-FB2047998857}"/>
+              </a:ext>
+            </a:extLst>
+          </p:cNvPr>
+          <p:cNvSpPr>
+            <a:spLocks noGrp="1"/>
+          </p:cNvSpPr>
+          <p:nvPr>
+            <p:ph type="title"/>
+          </p:nvPr>
+        </p:nvSpPr>
+        <p:spPr/>
+        <p:txBody>
+          <a:bodyPr/>
+          <a:lstStyle/>
+          <a:p>
+            <a:r>
+              <a:rPr lang="de-DE" dirty="0"/>
+              <a:t>Ablauf</a:t>
+            </a:r>
+          </a:p>
+        </p:txBody>
+      </p:sp>
+      <p:sp>
+        <p:nvSpPr>
+          <p:cNvPr id="3" name="Inhaltsplatzhalter 2">
+            <a:extLst>
+              <a:ext uri="{FF2B5EF4-FFF2-40B4-BE49-F238E27FC236}">
+                <a16:creationId xmlns:a16="http://schemas.microsoft.com/office/drawing/2014/main" id="{EE3D72F1-50E3-4EF9-804D-8B16516713F7}"/>
+              </a:ext>
+            </a:extLst>
+          </p:cNvPr>
+          <p:cNvSpPr>
+            <a:spLocks noGrp="1"/>
+          </p:cNvSpPr>
+          <p:nvPr>
+            <p:ph sz="quarter" idx="13"/>
+          </p:nvPr>
+        </p:nvSpPr>
+        <p:spPr/>
+        <p:txBody>
+          <a:bodyPr/>
+          <a:lstStyle/>
+          <a:p>
+            <a:r>
+              <a:rPr lang="de-DE" u="sng" dirty="0" err="1"/>
+              <a:t>Treetagger</a:t>
+            </a:r>
+            <a:endParaRPr lang="de-DE" u="sng" dirty="0"/>
+          </a:p>
+          <a:p>
+            <a:endParaRPr lang="de-DE" dirty="0"/>
+          </a:p>
+          <a:p>
+            <a:r>
+              <a:rPr lang="de-DE" dirty="0"/>
+              <a:t>Neue englische und deutsche Wörter werden mit </a:t>
+            </a:r>
+            <a:r>
+              <a:rPr lang="de-DE" dirty="0" err="1"/>
+              <a:t>Treetagger</a:t>
+            </a:r>
+            <a:r>
+              <a:rPr lang="de-DE" dirty="0"/>
+              <a:t> von</a:t>
+            </a:r>
+          </a:p>
+          <a:p>
+            <a:r>
+              <a:rPr lang="de-DE" dirty="0"/>
+              <a:t>Dr. Schmid bearbeitet</a:t>
+            </a:r>
+          </a:p>
+          <a:p>
+            <a:r>
+              <a:rPr lang="de-DE" dirty="0"/>
+              <a:t>-&gt; Lemmata für die neuen Wörter</a:t>
+            </a:r>
+          </a:p>
+          <a:p>
+            <a:endParaRPr lang="de-DE" dirty="0"/>
+          </a:p>
+          <a:p>
+            <a:r>
+              <a:rPr lang="de-DE" dirty="0"/>
+              <a:t>http://www.cis.uni-muenchen.de/~schmid/tools/TreeTagger/</a:t>
+            </a:r>
+          </a:p>
+        </p:txBody>
+      </p:sp>
+    </p:spTree>
+    <p:extLst>
+      <p:ext uri="{BB962C8B-B14F-4D97-AF65-F5344CB8AC3E}">
+        <p14:creationId xmlns:p14="http://schemas.microsoft.com/office/powerpoint/2010/main" val="1305140469"/>
+      </p:ext>
+    </p:extLst>
+  </p:cSld>
+  <p:clrMapOvr>
+    <a:masterClrMapping/>
+  </p:clrMapOvr>
+  <p:transition spd="med">
+    <p:fade/>
+  </p:transition>
+</p:sld>
+</file>
+
+<file path=ppt/slides/slide8.xml><?xml version="1.0" encoding="utf-8"?>
+<p:sld xmlns:a="http://schemas.openxmlformats.org/drawingml/2006/main" xmlns:r="http://schemas.openxmlformats.org/officeDocument/2006/relationships" xmlns:p="http://schemas.openxmlformats.org/presentationml/2006/main">
+  <p:cSld>
+    <p:spTree>
+      <p:nvGrpSpPr>
+        <p:cNvPr id="1" name=""/>
+        <p:cNvGrpSpPr/>
+        <p:nvPr/>
+      </p:nvGrpSpPr>
+      <p:grpSpPr>
+        <a:xfrm>
+          <a:off x="0" y="0"/>
+          <a:ext cx="0" cy="0"/>
+          <a:chOff x="0" y="0"/>
+          <a:chExt cx="0" cy="0"/>
+        </a:xfrm>
+      </p:grpSpPr>
+      <p:sp>
+        <p:nvSpPr>
+          <p:cNvPr id="2" name="Titel 1">
+            <a:extLst>
+              <a:ext uri="{FF2B5EF4-FFF2-40B4-BE49-F238E27FC236}">
+                <a16:creationId xmlns:a16="http://schemas.microsoft.com/office/drawing/2014/main" id="{2C0358E5-E9AD-4173-9458-C88CE39564CB}"/>
+              </a:ext>
+            </a:extLst>
+          </p:cNvPr>
+          <p:cNvSpPr>
+            <a:spLocks noGrp="1"/>
+          </p:cNvSpPr>
+          <p:nvPr>
+            <p:ph type="title"/>
+          </p:nvPr>
+        </p:nvSpPr>
+        <p:spPr/>
+        <p:txBody>
+          <a:bodyPr/>
+          <a:lstStyle/>
+          <a:p>
+            <a:r>
+              <a:rPr lang="de-DE" dirty="0"/>
+              <a:t>Ablauf</a:t>
+            </a:r>
+          </a:p>
+        </p:txBody>
+      </p:sp>
+      <p:sp>
+        <p:nvSpPr>
+          <p:cNvPr id="3" name="Inhaltsplatzhalter 2">
+            <a:extLst>
+              <a:ext uri="{FF2B5EF4-FFF2-40B4-BE49-F238E27FC236}">
+                <a16:creationId xmlns:a16="http://schemas.microsoft.com/office/drawing/2014/main" id="{84A03CFE-D89B-483D-9B74-5C84BF564E8E}"/>
+              </a:ext>
+            </a:extLst>
+          </p:cNvPr>
+          <p:cNvSpPr>
+            <a:spLocks noGrp="1"/>
+          </p:cNvSpPr>
+          <p:nvPr>
+            <p:ph sz="quarter" idx="13"/>
+          </p:nvPr>
+        </p:nvSpPr>
+        <p:spPr/>
+        <p:txBody>
+          <a:bodyPr/>
+          <a:lstStyle/>
+          <a:p>
+            <a:r>
+              <a:rPr lang="de-DE" u="sng" dirty="0"/>
+              <a:t>Neues Lexikon</a:t>
+            </a:r>
+          </a:p>
+          <a:p>
+            <a:endParaRPr lang="de-DE" dirty="0"/>
+          </a:p>
+          <a:p>
+            <a:r>
+              <a:rPr lang="de-DE" dirty="0"/>
+              <a:t>Einträge aus dem Vergleich mit dem </a:t>
+            </a:r>
+            <a:r>
+              <a:rPr lang="de-DE" dirty="0" err="1"/>
+              <a:t>CisLex</a:t>
+            </a:r>
+            <a:endParaRPr lang="de-DE" dirty="0"/>
+          </a:p>
+          <a:p>
+            <a:r>
+              <a:rPr lang="de-DE" dirty="0"/>
+              <a:t>-&gt; Von Dr. </a:t>
+            </a:r>
+            <a:r>
+              <a:rPr lang="de-DE" dirty="0" err="1"/>
+              <a:t>Hadersbeck</a:t>
+            </a:r>
+            <a:r>
+              <a:rPr lang="de-DE" dirty="0"/>
+              <a:t> bereitgestellt</a:t>
+            </a:r>
+          </a:p>
+          <a:p>
+            <a:endParaRPr lang="de-DE" dirty="0"/>
+          </a:p>
+          <a:p>
+            <a:r>
+              <a:rPr lang="de-DE" dirty="0"/>
+              <a:t>Säuberung von </a:t>
+            </a:r>
+            <a:r>
+              <a:rPr lang="de-DE" dirty="0" err="1"/>
+              <a:t>duplikaten</a:t>
+            </a:r>
+            <a:r>
+              <a:rPr lang="de-DE" dirty="0"/>
+              <a:t> und nicht benötigten Informationen</a:t>
+            </a:r>
+          </a:p>
+          <a:p>
+            <a:endParaRPr lang="de-DE" dirty="0"/>
+          </a:p>
+          <a:p>
+            <a:endParaRPr lang="de-DE" dirty="0"/>
+          </a:p>
+        </p:txBody>
+      </p:sp>
+      <p:pic>
+        <p:nvPicPr>
+          <p:cNvPr id="4" name="Grafik 3">
+            <a:extLst>
+              <a:ext uri="{FF2B5EF4-FFF2-40B4-BE49-F238E27FC236}">
+                <a16:creationId xmlns:a16="http://schemas.microsoft.com/office/drawing/2014/main" id="{D15F8C97-24BF-42DE-B51E-3E226E1C082D}"/>
+              </a:ext>
+            </a:extLst>
+          </p:cNvPr>
+          <p:cNvPicPr>
+            <a:picLocks noChangeAspect="1"/>
+          </p:cNvPicPr>
+          <p:nvPr/>
+        </p:nvPicPr>
+        <p:blipFill>
+          <a:blip r:embed="rId2"/>
+          <a:stretch>
+            <a:fillRect/>
+          </a:stretch>
+        </p:blipFill>
+        <p:spPr>
+          <a:xfrm>
+            <a:off x="2051720" y="4221088"/>
+            <a:ext cx="4508748" cy="2059487"/>
+          </a:xfrm>
+          <a:prstGeom prst="rect">
+            <a:avLst/>
+          </a:prstGeom>
+        </p:spPr>
+      </p:pic>
+    </p:spTree>
+    <p:extLst>
+      <p:ext uri="{BB962C8B-B14F-4D97-AF65-F5344CB8AC3E}">
+        <p14:creationId xmlns:p14="http://schemas.microsoft.com/office/powerpoint/2010/main" val="1501954675"/>
+      </p:ext>
+    </p:extLst>
+  </p:cSld>
+  <p:clrMapOvr>
+    <a:masterClrMapping/>
+  </p:clrMapOvr>
+  <p:transition spd="med">
+    <p:fade/>
+  </p:transition>
+</p:sld>
+</file>
+
+<file path=ppt/slides/slide9.xml><?xml version="1.0" encoding="utf-8"?>
+<p:sld xmlns:a="http://schemas.openxmlformats.org/drawingml/2006/main" xmlns:r="http://schemas.openxmlformats.org/officeDocument/2006/relationships" xmlns:p="http://schemas.openxmlformats.org/presentationml/2006/main">
+  <p:cSld>
+    <p:spTree>
+      <p:nvGrpSpPr>
+        <p:cNvPr id="1" name=""/>
+        <p:cNvGrpSpPr/>
+        <p:nvPr/>
+      </p:nvGrpSpPr>
+      <p:grpSpPr>
+        <a:xfrm>
+          <a:off x="0" y="0"/>
+          <a:ext cx="0" cy="0"/>
+          <a:chOff x="0" y="0"/>
+          <a:chExt cx="0" cy="0"/>
+        </a:xfrm>
+      </p:grpSpPr>
+      <p:sp>
+        <p:nvSpPr>
+          <p:cNvPr id="2" name="Titel 1">
+            <a:extLst>
+              <a:ext uri="{FF2B5EF4-FFF2-40B4-BE49-F238E27FC236}">
+                <a16:creationId xmlns:a16="http://schemas.microsoft.com/office/drawing/2014/main" id="{6C59ED6B-94CE-4160-A140-D69ED1C6476F}"/>
+              </a:ext>
+            </a:extLst>
+          </p:cNvPr>
+          <p:cNvSpPr>
+            <a:spLocks noGrp="1"/>
+          </p:cNvSpPr>
+          <p:nvPr>
+            <p:ph type="title"/>
+          </p:nvPr>
+        </p:nvSpPr>
+        <p:spPr/>
+        <p:txBody>
+          <a:bodyPr/>
+          <a:lstStyle/>
+          <a:p>
+            <a:r>
+              <a:rPr lang="de-DE" dirty="0"/>
+              <a:t>Ablauf</a:t>
+            </a:r>
+          </a:p>
+        </p:txBody>
+      </p:sp>
+      <p:sp>
+        <p:nvSpPr>
+          <p:cNvPr id="3" name="Inhaltsplatzhalter 2">
+            <a:extLst>
+              <a:ext uri="{FF2B5EF4-FFF2-40B4-BE49-F238E27FC236}">
+                <a16:creationId xmlns:a16="http://schemas.microsoft.com/office/drawing/2014/main" id="{DF4B9698-1157-4E6D-A4BC-364D4900C636}"/>
+              </a:ext>
+            </a:extLst>
+          </p:cNvPr>
+          <p:cNvSpPr>
+            <a:spLocks noGrp="1"/>
+          </p:cNvSpPr>
+          <p:nvPr>
+            <p:ph sz="quarter" idx="13"/>
+          </p:nvPr>
+        </p:nvSpPr>
+        <p:spPr/>
+        <p:txBody>
+          <a:bodyPr/>
+          <a:lstStyle/>
+          <a:p>
+            <a:r>
+              <a:rPr lang="de-DE" u="sng" dirty="0" err="1"/>
+              <a:t>Wictionary</a:t>
+            </a:r>
+            <a:endParaRPr lang="de-DE" u="sng" dirty="0"/>
+          </a:p>
+          <a:p>
+            <a:endParaRPr lang="de-DE" u="sng" dirty="0"/>
+          </a:p>
+          <a:p>
+            <a:endParaRPr lang="de-DE" u="sng" dirty="0"/>
+          </a:p>
+          <a:p>
+            <a:r>
+              <a:rPr lang="de-DE"/>
+              <a:t>Di -&gt;</a:t>
+            </a:r>
+            <a:endParaRPr lang="de-DE" dirty="0"/>
+          </a:p>
+        </p:txBody>
+      </p:sp>
+    </p:spTree>
+    <p:extLst>
+      <p:ext uri="{BB962C8B-B14F-4D97-AF65-F5344CB8AC3E}">
+        <p14:creationId xmlns:p14="http://schemas.microsoft.com/office/powerpoint/2010/main" val="2173397072"/>
       </p:ext>
     </p:extLst>
   </p:cSld>

</xml_diff>